<commit_message>
update intro; readme; add discussion
</commit_message>
<xml_diff>
--- a/figs/Transition-Diagram.pptx
+++ b/figs/Transition-Diagram.pptx
@@ -259,7 +259,7 @@
           <a:p>
             <a:fld id="{716A3162-A438-A24B-9254-2C45691FFFE7}" type="datetimeFigureOut">
               <a:rPr lang="en-US" smtClean="0"/>
-              <a:t>7/4/22</a:t>
+              <a:t>7/15/22</a:t>
             </a:fld>
             <a:endParaRPr lang="en-US"/>
           </a:p>
@@ -457,7 +457,7 @@
           <a:p>
             <a:fld id="{716A3162-A438-A24B-9254-2C45691FFFE7}" type="datetimeFigureOut">
               <a:rPr lang="en-US" smtClean="0"/>
-              <a:t>7/4/22</a:t>
+              <a:t>7/15/22</a:t>
             </a:fld>
             <a:endParaRPr lang="en-US"/>
           </a:p>
@@ -665,7 +665,7 @@
           <a:p>
             <a:fld id="{716A3162-A438-A24B-9254-2C45691FFFE7}" type="datetimeFigureOut">
               <a:rPr lang="en-US" smtClean="0"/>
-              <a:t>7/4/22</a:t>
+              <a:t>7/15/22</a:t>
             </a:fld>
             <a:endParaRPr lang="en-US"/>
           </a:p>
@@ -863,7 +863,7 @@
           <a:p>
             <a:fld id="{716A3162-A438-A24B-9254-2C45691FFFE7}" type="datetimeFigureOut">
               <a:rPr lang="en-US" smtClean="0"/>
-              <a:t>7/4/22</a:t>
+              <a:t>7/15/22</a:t>
             </a:fld>
             <a:endParaRPr lang="en-US"/>
           </a:p>
@@ -1138,7 +1138,7 @@
           <a:p>
             <a:fld id="{716A3162-A438-A24B-9254-2C45691FFFE7}" type="datetimeFigureOut">
               <a:rPr lang="en-US" smtClean="0"/>
-              <a:t>7/4/22</a:t>
+              <a:t>7/15/22</a:t>
             </a:fld>
             <a:endParaRPr lang="en-US"/>
           </a:p>
@@ -1403,7 +1403,7 @@
           <a:p>
             <a:fld id="{716A3162-A438-A24B-9254-2C45691FFFE7}" type="datetimeFigureOut">
               <a:rPr lang="en-US" smtClean="0"/>
-              <a:t>7/4/22</a:t>
+              <a:t>7/15/22</a:t>
             </a:fld>
             <a:endParaRPr lang="en-US"/>
           </a:p>
@@ -1815,7 +1815,7 @@
           <a:p>
             <a:fld id="{716A3162-A438-A24B-9254-2C45691FFFE7}" type="datetimeFigureOut">
               <a:rPr lang="en-US" smtClean="0"/>
-              <a:t>7/4/22</a:t>
+              <a:t>7/15/22</a:t>
             </a:fld>
             <a:endParaRPr lang="en-US"/>
           </a:p>
@@ -1956,7 +1956,7 @@
           <a:p>
             <a:fld id="{716A3162-A438-A24B-9254-2C45691FFFE7}" type="datetimeFigureOut">
               <a:rPr lang="en-US" smtClean="0"/>
-              <a:t>7/4/22</a:t>
+              <a:t>7/15/22</a:t>
             </a:fld>
             <a:endParaRPr lang="en-US"/>
           </a:p>
@@ -2069,7 +2069,7 @@
           <a:p>
             <a:fld id="{716A3162-A438-A24B-9254-2C45691FFFE7}" type="datetimeFigureOut">
               <a:rPr lang="en-US" smtClean="0"/>
-              <a:t>7/4/22</a:t>
+              <a:t>7/15/22</a:t>
             </a:fld>
             <a:endParaRPr lang="en-US"/>
           </a:p>
@@ -2380,7 +2380,7 @@
           <a:p>
             <a:fld id="{716A3162-A438-A24B-9254-2C45691FFFE7}" type="datetimeFigureOut">
               <a:rPr lang="en-US" smtClean="0"/>
-              <a:t>7/4/22</a:t>
+              <a:t>7/15/22</a:t>
             </a:fld>
             <a:endParaRPr lang="en-US"/>
           </a:p>
@@ -2668,7 +2668,7 @@
           <a:p>
             <a:fld id="{716A3162-A438-A24B-9254-2C45691FFFE7}" type="datetimeFigureOut">
               <a:rPr lang="en-US" smtClean="0"/>
-              <a:t>7/4/22</a:t>
+              <a:t>7/15/22</a:t>
             </a:fld>
             <a:endParaRPr lang="en-US"/>
           </a:p>
@@ -2909,7 +2909,7 @@
           <a:p>
             <a:fld id="{716A3162-A438-A24B-9254-2C45691FFFE7}" type="datetimeFigureOut">
               <a:rPr lang="en-US" smtClean="0"/>
-              <a:t>7/4/22</a:t>
+              <a:t>7/15/22</a:t>
             </a:fld>
             <a:endParaRPr lang="en-US"/>
           </a:p>
@@ -3487,8 +3487,12 @@
             <a:p>
               <a:pPr algn="ctr"/>
               <a:r>
+                <a:rPr lang="en-US"/>
+                <a:t>Maladaptive </a:t>
+              </a:r>
+              <a:r>
                 <a:rPr lang="en-US" dirty="0"/>
-                <a:t>Driven Exercise</a:t>
+                <a:t>Exercise</a:t>
               </a:r>
             </a:p>
           </p:txBody>

</xml_diff>